<commit_message>
SLD-28: Add shape geometry property
</commit_message>
<xml_diff>
--- a/src/SlideDotNet.Tests/Resource/021.pptx
+++ b/src/SlideDotNet.Tests/Resource/021.pptx
@@ -1,6 +1,6 @@
 
 <file path=ppt/presentation.xml><?xml version="1.0" encoding="utf-8"?>
-<p:presentation xmlns:a="http://schemas.openxmlformats.org/drawingml/2006/main" xmlns:r="http://schemas.openxmlformats.org/officeDocument/2006/relationships" xmlns:p="http://schemas.openxmlformats.org/presentationml/2006/main" showSpecialPlsOnTitleSld="0" removePersonalInfoOnSave="1" saveSubsetFonts="1">
+<p:presentation xmlns:a="http://schemas.openxmlformats.org/drawingml/2006/main" xmlns:r="http://schemas.openxmlformats.org/officeDocument/2006/relationships" xmlns:p="http://schemas.openxmlformats.org/presentationml/2006/main" removePersonalInfoOnSave="1" saveSubsetFonts="1">
   <p:sldMasterIdLst>
     <p:sldMasterId id="2147483650" r:id="rId1"/>
     <p:sldMasterId id="2147483653" r:id="rId2"/>
@@ -32786,7 +32786,7 @@
             <a:fld id="{E0E5718D-064E-42C1-91CB-2226096DD678}" type="datetimeFigureOut">
               <a:rPr lang="en-GB" smtClean="0"/>
               <a:pPr/>
-              <a:t>15/03/2020</a:t>
+              <a:t>03/04/2020</a:t>
             </a:fld>
             <a:endParaRPr lang="en-GB"/>
           </a:p>
@@ -32953,7 +32953,7 @@
             <a:fld id="{416B9FA3-0B3D-4699-8696-1174BE157FCC}" type="datetimeFigureOut">
               <a:rPr lang="en-GB" smtClean="0"/>
               <a:pPr/>
-              <a:t>15/03/2020</a:t>
+              <a:t>03/04/2020</a:t>
             </a:fld>
             <a:endParaRPr lang="en-GB"/>
           </a:p>
@@ -33438,7 +33438,6 @@
   <p:clrMapOvr>
     <a:masterClrMapping/>
   </p:clrMapOvr>
-  <p:hf hdr="0"/>
 </p:sldLayout>
 </file>
 
@@ -33631,11 +33630,6 @@
           <a:bodyPr/>
           <a:lstStyle/>
           <a:p>
-            <a:fld id="{4217E7DB-962B-4B4B-B30F-3F53BD2C8D5E}" type="datetime1">
-              <a:rPr lang="ru-RU" smtClean="0"/>
-              <a:pPr/>
-              <a:t>15.03.2020</a:t>
-            </a:fld>
             <a:endParaRPr lang="ru-RU"/>
           </a:p>
         </p:txBody>
@@ -33655,6 +33649,10 @@
           <a:bodyPr/>
           <a:lstStyle/>
           <a:p>
+            <a:r>
+              <a:rPr lang="en-US"/>
+              <a:t>test footer</a:t>
+            </a:r>
             <a:endParaRPr lang="ru-RU"/>
           </a:p>
         </p:txBody>
@@ -33801,11 +33799,6 @@
           <a:bodyPr/>
           <a:lstStyle/>
           <a:p>
-            <a:fld id="{16A52B05-BE5E-4BA3-BD05-DF042E54FF88}" type="datetime1">
-              <a:rPr lang="ru-RU" smtClean="0"/>
-              <a:pPr/>
-              <a:t>15.03.2020</a:t>
-            </a:fld>
             <a:endParaRPr lang="ru-RU"/>
           </a:p>
         </p:txBody>
@@ -33825,6 +33818,10 @@
           <a:bodyPr/>
           <a:lstStyle/>
           <a:p>
+            <a:r>
+              <a:rPr lang="en-US"/>
+              <a:t>test footer</a:t>
+            </a:r>
             <a:endParaRPr lang="ru-RU"/>
           </a:p>
         </p:txBody>
@@ -33981,11 +33978,6 @@
           <a:bodyPr/>
           <a:lstStyle/>
           <a:p>
-            <a:fld id="{D60AA07F-DA42-4E58-B1F1-1FBCA3A3EDE5}" type="datetime1">
-              <a:rPr lang="ru-RU" smtClean="0"/>
-              <a:pPr/>
-              <a:t>15.03.2020</a:t>
-            </a:fld>
             <a:endParaRPr lang="ru-RU"/>
           </a:p>
         </p:txBody>
@@ -34005,6 +33997,10 @@
           <a:bodyPr/>
           <a:lstStyle/>
           <a:p>
+            <a:r>
+              <a:rPr lang="en-US"/>
+              <a:t>test footer</a:t>
+            </a:r>
             <a:endParaRPr lang="ru-RU"/>
           </a:p>
         </p:txBody>
@@ -34223,11 +34219,6 @@
           <a:bodyPr/>
           <a:lstStyle/>
           <a:p>
-            <a:fld id="{26F166BB-AE63-4C72-B422-B0B9BD0DFC25}" type="datetime1">
-              <a:rPr lang="ru-RU" smtClean="0"/>
-              <a:pPr/>
-              <a:t>15.03.2020</a:t>
-            </a:fld>
             <a:endParaRPr lang="ru-RU"/>
           </a:p>
         </p:txBody>
@@ -34247,6 +34238,10 @@
           <a:bodyPr/>
           <a:lstStyle/>
           <a:p>
+            <a:r>
+              <a:rPr lang="en-US"/>
+              <a:t>test footer</a:t>
+            </a:r>
             <a:endParaRPr lang="ru-RU"/>
           </a:p>
         </p:txBody>
@@ -34393,11 +34388,6 @@
           <a:bodyPr/>
           <a:lstStyle/>
           <a:p>
-            <a:fld id="{19C3AD67-1347-474E-A12E-E8B2AB07FD62}" type="datetime1">
-              <a:rPr lang="ru-RU" smtClean="0"/>
-              <a:pPr/>
-              <a:t>15.03.2020</a:t>
-            </a:fld>
             <a:endParaRPr lang="ru-RU"/>
           </a:p>
         </p:txBody>
@@ -34417,6 +34407,10 @@
           <a:bodyPr/>
           <a:lstStyle/>
           <a:p>
+            <a:r>
+              <a:rPr lang="en-US"/>
+              <a:t>test footer</a:t>
+            </a:r>
             <a:endParaRPr lang="ru-RU"/>
           </a:p>
         </p:txBody>
@@ -34640,11 +34634,6 @@
           <a:bodyPr/>
           <a:lstStyle/>
           <a:p>
-            <a:fld id="{65C6D054-CB37-4D20-9952-96826A8D557C}" type="datetime1">
-              <a:rPr lang="ru-RU" smtClean="0"/>
-              <a:pPr/>
-              <a:t>15.03.2020</a:t>
-            </a:fld>
             <a:endParaRPr lang="ru-RU"/>
           </a:p>
         </p:txBody>
@@ -34664,6 +34653,10 @@
           <a:bodyPr/>
           <a:lstStyle/>
           <a:p>
+            <a:r>
+              <a:rPr lang="en-US"/>
+              <a:t>test footer</a:t>
+            </a:r>
             <a:endParaRPr lang="ru-RU"/>
           </a:p>
         </p:txBody>
@@ -34927,11 +34920,6 @@
           <a:bodyPr/>
           <a:lstStyle/>
           <a:p>
-            <a:fld id="{6E11A8BA-E65E-45A1-A199-54463ECCE8A5}" type="datetime1">
-              <a:rPr lang="ru-RU" smtClean="0"/>
-              <a:pPr/>
-              <a:t>15.03.2020</a:t>
-            </a:fld>
             <a:endParaRPr lang="ru-RU"/>
           </a:p>
         </p:txBody>
@@ -34951,6 +34939,10 @@
           <a:bodyPr/>
           <a:lstStyle/>
           <a:p>
+            <a:r>
+              <a:rPr lang="en-US"/>
+              <a:t>test footer</a:t>
+            </a:r>
             <a:endParaRPr lang="ru-RU"/>
           </a:p>
         </p:txBody>
@@ -35348,11 +35340,6 @@
           <a:bodyPr/>
           <a:lstStyle/>
           <a:p>
-            <a:fld id="{0FF26047-4F06-49F6-9E7D-05E374D29F43}" type="datetime1">
-              <a:rPr lang="ru-RU" smtClean="0"/>
-              <a:pPr/>
-              <a:t>15.03.2020</a:t>
-            </a:fld>
             <a:endParaRPr lang="ru-RU"/>
           </a:p>
         </p:txBody>
@@ -35372,6 +35359,10 @@
           <a:bodyPr/>
           <a:lstStyle/>
           <a:p>
+            <a:r>
+              <a:rPr lang="en-US"/>
+              <a:t>test footer</a:t>
+            </a:r>
             <a:endParaRPr lang="ru-RU"/>
           </a:p>
         </p:txBody>
@@ -35467,11 +35458,6 @@
           <a:bodyPr/>
           <a:lstStyle/>
           <a:p>
-            <a:fld id="{2BC0867C-689E-4E82-895B-D8B32AF1345F}" type="datetime1">
-              <a:rPr lang="ru-RU" smtClean="0"/>
-              <a:pPr/>
-              <a:t>15.03.2020</a:t>
-            </a:fld>
             <a:endParaRPr lang="ru-RU"/>
           </a:p>
         </p:txBody>
@@ -35491,6 +35477,10 @@
           <a:bodyPr/>
           <a:lstStyle/>
           <a:p>
+            <a:r>
+              <a:rPr lang="en-US"/>
+              <a:t>test footer</a:t>
+            </a:r>
             <a:endParaRPr lang="ru-RU"/>
           </a:p>
         </p:txBody>
@@ -35564,11 +35554,6 @@
           <a:bodyPr/>
           <a:lstStyle/>
           <a:p>
-            <a:fld id="{7AC23BE3-6604-4868-91A3-0EA765E0838F}" type="datetime1">
-              <a:rPr lang="ru-RU" smtClean="0"/>
-              <a:pPr/>
-              <a:t>15.03.2020</a:t>
-            </a:fld>
             <a:endParaRPr lang="ru-RU"/>
           </a:p>
         </p:txBody>
@@ -35588,6 +35573,10 @@
           <a:bodyPr/>
           <a:lstStyle/>
           <a:p>
+            <a:r>
+              <a:rPr lang="en-US"/>
+              <a:t>test footer</a:t>
+            </a:r>
             <a:endParaRPr lang="ru-RU"/>
           </a:p>
         </p:txBody>
@@ -35841,11 +35830,6 @@
           <a:bodyPr/>
           <a:lstStyle/>
           <a:p>
-            <a:fld id="{6BABE36C-9F04-445F-A3D3-7EB0FCEF50D8}" type="datetime1">
-              <a:rPr lang="ru-RU" smtClean="0"/>
-              <a:pPr/>
-              <a:t>15.03.2020</a:t>
-            </a:fld>
             <a:endParaRPr lang="ru-RU"/>
           </a:p>
         </p:txBody>
@@ -35865,6 +35849,10 @@
           <a:bodyPr/>
           <a:lstStyle/>
           <a:p>
+            <a:r>
+              <a:rPr lang="en-US"/>
+              <a:t>test footer</a:t>
+            </a:r>
             <a:endParaRPr lang="ru-RU"/>
           </a:p>
         </p:txBody>
@@ -36082,7 +36070,7 @@
   <p:sldLayoutIdLst>
     <p:sldLayoutId id="2147483652" r:id="rId1"/>
   </p:sldLayoutIdLst>
-  <p:hf hdr="0"/>
+  <p:hf sldNum="0" hdr="0" dt="0"/>
   <p:txStyles>
     <p:titleStyle>
       <a:lvl1pPr algn="l" defTabSz="1018705" rtl="0" eaLnBrk="1" latinLnBrk="0" hangingPunct="1">
@@ -36565,11 +36553,6 @@
             </a:lvl1pPr>
           </a:lstStyle>
           <a:p>
-            <a:fld id="{D75E3DDE-6E73-4F7E-967E-302E9A50C532}" type="datetime1">
-              <a:rPr lang="ru-RU" smtClean="0"/>
-              <a:pPr/>
-              <a:t>15.03.2020</a:t>
-            </a:fld>
             <a:endParaRPr lang="ru-RU"/>
           </a:p>
         </p:txBody>
@@ -36607,6 +36590,10 @@
             </a:lvl1pPr>
           </a:lstStyle>
           <a:p>
+            <a:r>
+              <a:rPr lang="en-US"/>
+              <a:t>test footer</a:t>
+            </a:r>
             <a:endParaRPr lang="ru-RU"/>
           </a:p>
         </p:txBody>
@@ -36674,7 +36661,7 @@
     <p:sldLayoutId id="2147483663" r:id="rId10"/>
     <p:sldLayoutId id="2147483664" r:id="rId11"/>
   </p:sldLayoutIdLst>
-  <p:hf hdr="0" ftr="0" dt="0"/>
+  <p:hf sldNum="0" hdr="0" dt="0"/>
   <p:txStyles>
     <p:titleStyle>
       <a:lvl1pPr algn="ctr" defTabSz="1008126" rtl="0" eaLnBrk="1" latinLnBrk="0" hangingPunct="1">
@@ -37349,54 +37336,76 @@
       </p:grpSpPr>
       <p:sp>
         <p:nvSpPr>
-          <p:cNvPr id="10" name="Номер слайда 9"/>
+          <p:cNvPr id="2" name="Нижний колонтитул 1">
+            <a:extLst>
+              <a:ext uri="{FF2B5EF4-FFF2-40B4-BE49-F238E27FC236}">
+                <a16:creationId xmlns:a16="http://schemas.microsoft.com/office/drawing/2014/main" id="{A3863823-7D80-4327-A8FD-6FBC386BACE5}"/>
+              </a:ext>
+            </a:extLst>
+          </p:cNvPr>
           <p:cNvSpPr>
             <a:spLocks noGrp="1"/>
           </p:cNvSpPr>
           <p:nvPr>
-            <p:ph type="sldNum" sz="quarter" idx="12"/>
+            <p:ph type="ftr" sz="quarter" idx="11"/>
           </p:nvPr>
         </p:nvSpPr>
         <p:spPr/>
-        <p:style>
-          <a:lnRef idx="2">
-            <a:schemeClr val="accent5"/>
-          </a:lnRef>
-          <a:fillRef idx="1">
-            <a:schemeClr val="lt1"/>
-          </a:fillRef>
-          <a:effectRef idx="0">
-            <a:schemeClr val="accent5"/>
-          </a:effectRef>
-          <a:fontRef idx="minor">
-            <a:schemeClr val="dk1"/>
-          </a:fontRef>
-        </p:style>
         <p:txBody>
           <a:bodyPr/>
           <a:lstStyle/>
           <a:p>
-            <a:pPr defTabSz="1008126"/>
-            <a:fld id="{F7F8E84E-F60B-4AD1-BBB3-96F1A0B10F2D}" type="slidenum">
-              <a:rPr lang="ru-RU">
-                <a:solidFill>
-                  <a:prstClr val="black">
-                    <a:tint val="75000"/>
-                  </a:prstClr>
-                </a:solidFill>
-                <a:latin typeface="Calibri"/>
-              </a:rPr>
-              <a:pPr defTabSz="1008126"/>
-              <a:t>4</a:t>
-            </a:fld>
-            <a:endParaRPr lang="ru-RU" dirty="0">
-              <a:solidFill>
-                <a:prstClr val="black">
-                  <a:tint val="75000"/>
-                </a:prstClr>
-              </a:solidFill>
-              <a:latin typeface="Calibri"/>
-            </a:endParaRPr>
+            <a:r>
+              <a:rPr lang="en-US"/>
+              <a:t>test footer</a:t>
+            </a:r>
+            <a:endParaRPr lang="ru-RU"/>
+          </a:p>
+        </p:txBody>
+      </p:sp>
+      <p:sp>
+        <p:nvSpPr>
+          <p:cNvPr id="3" name="Овал 2">
+            <a:extLst>
+              <a:ext uri="{FF2B5EF4-FFF2-40B4-BE49-F238E27FC236}">
+                <a16:creationId xmlns:a16="http://schemas.microsoft.com/office/drawing/2014/main" id="{37F62862-C0DA-47B0-942A-6F1C57858227}"/>
+              </a:ext>
+            </a:extLst>
+          </p:cNvPr>
+          <p:cNvSpPr/>
+          <p:nvPr/>
+        </p:nvSpPr>
+        <p:spPr>
+          <a:xfrm>
+            <a:off x="594172" y="756295"/>
+            <a:ext cx="1368152" cy="864096"/>
+          </a:xfrm>
+          <a:prstGeom prst="ellipse">
+            <a:avLst/>
+          </a:prstGeom>
+        </p:spPr>
+        <p:style>
+          <a:lnRef idx="2">
+            <a:schemeClr val="accent1">
+              <a:shade val="50000"/>
+            </a:schemeClr>
+          </a:lnRef>
+          <a:fillRef idx="1">
+            <a:schemeClr val="accent1"/>
+          </a:fillRef>
+          <a:effectRef idx="0">
+            <a:schemeClr val="accent1"/>
+          </a:effectRef>
+          <a:fontRef idx="minor">
+            <a:schemeClr val="lt1"/>
+          </a:fontRef>
+        </p:style>
+        <p:txBody>
+          <a:bodyPr rtlCol="0" anchor="ctr"/>
+          <a:lstStyle/>
+          <a:p>
+            <a:pPr algn="ctr"/>
+            <a:endParaRPr lang="ru-UA"/>
           </a:p>
         </p:txBody>
       </p:sp>

</xml_diff>